<commit_message>
Deployed c58c3dd with MkDocs version: 1.4.1
</commit_message>
<xml_diff>
--- a/en/week-1/week-1.en.md_word.pptx
+++ b/en/week-1/week-1.en.md_word.pptx
@@ -24,7 +24,7 @@
     <p:sldId id="272" r:id="rId18"/>
     <p:sldId id="273" r:id="rId19"/>
   </p:sldIdLst>
-  <p:sldSz cx="9144000" cy="6858000" type="screen4x3"/>
+  <p:sldSz cx="9144000" cy="5143500" type="screen16x9"/>
   <p:notesSz cx="6858000" cy="9144000"/>
   <p:defaultTextStyle>
     <a:defPPr>
@@ -124,12 +124,12 @@
   <p:extLst>
     <p:ext uri="{EFAFB233-063F-42B5-8137-9DF3F51BA10A}">
       <p15:sldGuideLst xmlns:p15="http://schemas.microsoft.com/office/powerpoint/2012/main">
-        <p15:guide id="1" orient="horz" pos="2160">
+        <p15:guide id="1" orient="horz" pos="1620" userDrawn="1">
           <p15:clr>
             <a:srgbClr val="A4A3A4"/>
           </p15:clr>
         </p15:guide>
-        <p15:guide id="2" pos="2880">
+        <p15:guide id="2" pos="2880" userDrawn="1">
           <p15:clr>
             <a:srgbClr val="A4A3A4"/>
           </p15:clr>
@@ -169,8 +169,8 @@
         </p:nvSpPr>
         <p:spPr>
           <a:xfrm>
-            <a:off x="685800" y="2130425"/>
-            <a:ext cx="7772400" cy="1470025"/>
+            <a:off x="685800" y="1597819"/>
+            <a:ext cx="7772400" cy="1102519"/>
           </a:xfrm>
         </p:spPr>
         <p:txBody>
@@ -178,10 +178,9 @@
           <a:lstStyle/>
           <a:p>
             <a:r>
-              <a:rPr lang="en-US" smtClean="0"/>
+              <a:rPr lang="en-US"/>
               <a:t>Click to edit Master title style</a:t>
             </a:r>
-            <a:endParaRPr lang="en-US"/>
           </a:p>
         </p:txBody>
       </p:sp>
@@ -197,8 +196,8 @@
         </p:nvSpPr>
         <p:spPr>
           <a:xfrm>
-            <a:off x="1371600" y="3886200"/>
-            <a:ext cx="6400800" cy="1752600"/>
+            <a:off x="1371600" y="2914650"/>
+            <a:ext cx="6400800" cy="1314450"/>
           </a:xfrm>
         </p:spPr>
         <p:txBody>
@@ -214,7 +213,7 @@
                 </a:solidFill>
               </a:defRPr>
             </a:lvl1pPr>
-            <a:lvl2pPr marL="457200" indent="0" algn="ctr">
+            <a:lvl2pPr marL="342900" indent="0" algn="ctr">
               <a:buNone/>
               <a:defRPr>
                 <a:solidFill>
@@ -224,7 +223,7 @@
                 </a:solidFill>
               </a:defRPr>
             </a:lvl2pPr>
-            <a:lvl3pPr marL="914400" indent="0" algn="ctr">
+            <a:lvl3pPr marL="685800" indent="0" algn="ctr">
               <a:buNone/>
               <a:defRPr>
                 <a:solidFill>
@@ -234,7 +233,7 @@
                 </a:solidFill>
               </a:defRPr>
             </a:lvl3pPr>
-            <a:lvl4pPr marL="1371600" indent="0" algn="ctr">
+            <a:lvl4pPr marL="1028700" indent="0" algn="ctr">
               <a:buNone/>
               <a:defRPr>
                 <a:solidFill>
@@ -244,7 +243,7 @@
                 </a:solidFill>
               </a:defRPr>
             </a:lvl4pPr>
-            <a:lvl5pPr marL="1828800" indent="0" algn="ctr">
+            <a:lvl5pPr marL="1371600" indent="0" algn="ctr">
               <a:buNone/>
               <a:defRPr>
                 <a:solidFill>
@@ -254,7 +253,7 @@
                 </a:solidFill>
               </a:defRPr>
             </a:lvl5pPr>
-            <a:lvl6pPr marL="2286000" indent="0" algn="ctr">
+            <a:lvl6pPr marL="1714500" indent="0" algn="ctr">
               <a:buNone/>
               <a:defRPr>
                 <a:solidFill>
@@ -264,7 +263,7 @@
                 </a:solidFill>
               </a:defRPr>
             </a:lvl6pPr>
-            <a:lvl7pPr marL="2743200" indent="0" algn="ctr">
+            <a:lvl7pPr marL="2057400" indent="0" algn="ctr">
               <a:buNone/>
               <a:defRPr>
                 <a:solidFill>
@@ -274,7 +273,7 @@
                 </a:solidFill>
               </a:defRPr>
             </a:lvl7pPr>
-            <a:lvl8pPr marL="3200400" indent="0" algn="ctr">
+            <a:lvl8pPr marL="2400300" indent="0" algn="ctr">
               <a:buNone/>
               <a:defRPr>
                 <a:solidFill>
@@ -284,7 +283,7 @@
                 </a:solidFill>
               </a:defRPr>
             </a:lvl8pPr>
-            <a:lvl9pPr marL="3657600" indent="0" algn="ctr">
+            <a:lvl9pPr marL="2743200" indent="0" algn="ctr">
               <a:buNone/>
               <a:defRPr>
                 <a:solidFill>
@@ -297,10 +296,9 @@
           </a:lstStyle>
           <a:p>
             <a:r>
-              <a:rPr lang="en-US" smtClean="0"/>
+              <a:rPr lang="en-US"/>
               <a:t>Click to edit Master subtitle style</a:t>
             </a:r>
-            <a:endParaRPr lang="en-US"/>
           </a:p>
         </p:txBody>
       </p:sp>
@@ -321,7 +319,7 @@
           <a:p>
             <a:fld id="{241EB5C9-1307-BA42-ABA2-0BC069CD8E7F}" type="datetimeFigureOut">
               <a:rPr lang="en-US" smtClean="0"/>
-              <a:t>4/5/2019</a:t>
+              <a:t>1/2/22</a:t>
             </a:fld>
             <a:endParaRPr lang="en-US"/>
           </a:p>
@@ -415,10 +413,9 @@
           <a:lstStyle/>
           <a:p>
             <a:r>
-              <a:rPr lang="en-US" smtClean="0"/>
+              <a:rPr lang="en-US"/>
               <a:t>Click to edit Master title style</a:t>
             </a:r>
-            <a:endParaRPr lang="en-US"/>
           </a:p>
         </p:txBody>
       </p:sp>
@@ -439,38 +436,37 @@
           <a:p>
             <a:pPr lvl="0"/>
             <a:r>
-              <a:rPr lang="en-US" smtClean="0"/>
+              <a:rPr lang="en-US"/>
               <a:t>Click to edit Master text styles</a:t>
             </a:r>
           </a:p>
           <a:p>
             <a:pPr lvl="1"/>
             <a:r>
-              <a:rPr lang="en-US" smtClean="0"/>
+              <a:rPr lang="en-US"/>
               <a:t>Second level</a:t>
             </a:r>
           </a:p>
           <a:p>
             <a:pPr lvl="2"/>
             <a:r>
-              <a:rPr lang="en-US" smtClean="0"/>
+              <a:rPr lang="en-US"/>
               <a:t>Third level</a:t>
             </a:r>
           </a:p>
           <a:p>
             <a:pPr lvl="3"/>
             <a:r>
-              <a:rPr lang="en-US" smtClean="0"/>
+              <a:rPr lang="en-US"/>
               <a:t>Fourth level</a:t>
             </a:r>
           </a:p>
           <a:p>
             <a:pPr lvl="4"/>
             <a:r>
-              <a:rPr lang="en-US" smtClean="0"/>
+              <a:rPr lang="en-US"/>
               <a:t>Fifth level</a:t>
             </a:r>
-            <a:endParaRPr lang="en-US"/>
           </a:p>
         </p:txBody>
       </p:sp>
@@ -491,7 +487,7 @@
           <a:p>
             <a:fld id="{241EB5C9-1307-BA42-ABA2-0BC069CD8E7F}" type="datetimeFigureOut">
               <a:rPr lang="en-US" smtClean="0"/>
-              <a:t>4/5/2019</a:t>
+              <a:t>1/2/22</a:t>
             </a:fld>
             <a:endParaRPr lang="en-US"/>
           </a:p>
@@ -581,8 +577,8 @@
         </p:nvSpPr>
         <p:spPr>
           <a:xfrm>
-            <a:off x="6629400" y="274638"/>
-            <a:ext cx="2057400" cy="5851525"/>
+            <a:off x="6629400" y="205979"/>
+            <a:ext cx="2057400" cy="4388644"/>
           </a:xfrm>
         </p:spPr>
         <p:txBody>
@@ -590,10 +586,9 @@
           <a:lstStyle/>
           <a:p>
             <a:r>
-              <a:rPr lang="en-US" smtClean="0"/>
+              <a:rPr lang="en-US"/>
               <a:t>Click to edit Master title style</a:t>
             </a:r>
-            <a:endParaRPr lang="en-US"/>
           </a:p>
         </p:txBody>
       </p:sp>
@@ -609,8 +604,8 @@
         </p:nvSpPr>
         <p:spPr>
           <a:xfrm>
-            <a:off x="457200" y="274638"/>
-            <a:ext cx="6019800" cy="5851525"/>
+            <a:off x="457200" y="205979"/>
+            <a:ext cx="6019800" cy="4388644"/>
           </a:xfrm>
         </p:spPr>
         <p:txBody>
@@ -619,38 +614,37 @@
           <a:p>
             <a:pPr lvl="0"/>
             <a:r>
-              <a:rPr lang="en-US" smtClean="0"/>
+              <a:rPr lang="en-US"/>
               <a:t>Click to edit Master text styles</a:t>
             </a:r>
           </a:p>
           <a:p>
             <a:pPr lvl="1"/>
             <a:r>
-              <a:rPr lang="en-US" smtClean="0"/>
+              <a:rPr lang="en-US"/>
               <a:t>Second level</a:t>
             </a:r>
           </a:p>
           <a:p>
             <a:pPr lvl="2"/>
             <a:r>
-              <a:rPr lang="en-US" smtClean="0"/>
+              <a:rPr lang="en-US"/>
               <a:t>Third level</a:t>
             </a:r>
           </a:p>
           <a:p>
             <a:pPr lvl="3"/>
             <a:r>
-              <a:rPr lang="en-US" smtClean="0"/>
+              <a:rPr lang="en-US"/>
               <a:t>Fourth level</a:t>
             </a:r>
           </a:p>
           <a:p>
             <a:pPr lvl="4"/>
             <a:r>
-              <a:rPr lang="en-US" smtClean="0"/>
+              <a:rPr lang="en-US"/>
               <a:t>Fifth level</a:t>
             </a:r>
-            <a:endParaRPr lang="en-US"/>
           </a:p>
         </p:txBody>
       </p:sp>
@@ -671,7 +665,7 @@
           <a:p>
             <a:fld id="{241EB5C9-1307-BA42-ABA2-0BC069CD8E7F}" type="datetimeFigureOut">
               <a:rPr lang="en-US" smtClean="0"/>
-              <a:t>4/5/2019</a:t>
+              <a:t>1/2/22</a:t>
             </a:fld>
             <a:endParaRPr lang="en-US"/>
           </a:p>
@@ -765,10 +759,9 @@
           <a:lstStyle/>
           <a:p>
             <a:r>
-              <a:rPr lang="en-US" smtClean="0"/>
+              <a:rPr lang="en-US"/>
               <a:t>Click to edit Master title style</a:t>
             </a:r>
-            <a:endParaRPr lang="en-US"/>
           </a:p>
         </p:txBody>
       </p:sp>
@@ -789,38 +782,37 @@
           <a:p>
             <a:pPr lvl="0"/>
             <a:r>
-              <a:rPr lang="en-US" smtClean="0"/>
+              <a:rPr lang="en-US"/>
               <a:t>Click to edit Master text styles</a:t>
             </a:r>
           </a:p>
           <a:p>
             <a:pPr lvl="1"/>
             <a:r>
-              <a:rPr lang="en-US" smtClean="0"/>
+              <a:rPr lang="en-US"/>
               <a:t>Second level</a:t>
             </a:r>
           </a:p>
           <a:p>
             <a:pPr lvl="2"/>
             <a:r>
-              <a:rPr lang="en-US" smtClean="0"/>
+              <a:rPr lang="en-US"/>
               <a:t>Third level</a:t>
             </a:r>
           </a:p>
           <a:p>
             <a:pPr lvl="3"/>
             <a:r>
-              <a:rPr lang="en-US" smtClean="0"/>
+              <a:rPr lang="en-US"/>
               <a:t>Fourth level</a:t>
             </a:r>
           </a:p>
           <a:p>
             <a:pPr lvl="4"/>
             <a:r>
-              <a:rPr lang="en-US" smtClean="0"/>
+              <a:rPr lang="en-US"/>
               <a:t>Fifth level</a:t>
             </a:r>
-            <a:endParaRPr lang="en-US"/>
           </a:p>
         </p:txBody>
       </p:sp>
@@ -841,7 +833,7 @@
           <a:p>
             <a:fld id="{241EB5C9-1307-BA42-ABA2-0BC069CD8E7F}" type="datetimeFigureOut">
               <a:rPr lang="en-US" smtClean="0"/>
-              <a:t>4/5/2019</a:t>
+              <a:t>1/2/22</a:t>
             </a:fld>
             <a:endParaRPr lang="en-US"/>
           </a:p>
@@ -931,23 +923,22 @@
         </p:nvSpPr>
         <p:spPr>
           <a:xfrm>
-            <a:off x="722313" y="4406900"/>
-            <a:ext cx="7772400" cy="1362075"/>
+            <a:off x="722313" y="3305176"/>
+            <a:ext cx="7772400" cy="1021556"/>
           </a:xfrm>
         </p:spPr>
         <p:txBody>
           <a:bodyPr anchor="t"/>
           <a:lstStyle>
             <a:lvl1pPr algn="l">
-              <a:defRPr sz="4000" b="1" cap="all"/>
+              <a:defRPr sz="3000" b="1" cap="all"/>
             </a:lvl1pPr>
           </a:lstStyle>
           <a:p>
             <a:r>
-              <a:rPr lang="en-US" smtClean="0"/>
+              <a:rPr lang="en-US"/>
               <a:t>Click to edit Master title style</a:t>
             </a:r>
-            <a:endParaRPr lang="en-US"/>
           </a:p>
         </p:txBody>
       </p:sp>
@@ -963,8 +954,8 @@
         </p:nvSpPr>
         <p:spPr>
           <a:xfrm>
-            <a:off x="722313" y="2906713"/>
-            <a:ext cx="7772400" cy="1500187"/>
+            <a:off x="722313" y="2180035"/>
+            <a:ext cx="7772400" cy="1125140"/>
           </a:xfrm>
         </p:spPr>
         <p:txBody>
@@ -972,7 +963,7 @@
           <a:lstStyle>
             <a:lvl1pPr marL="0" indent="0">
               <a:buNone/>
-              <a:defRPr sz="2000">
+              <a:defRPr sz="1500">
                 <a:solidFill>
                   <a:schemeClr val="tx1">
                     <a:tint val="75000"/>
@@ -980,9 +971,9 @@
                 </a:solidFill>
               </a:defRPr>
             </a:lvl1pPr>
-            <a:lvl2pPr marL="457200" indent="0">
-              <a:buNone/>
-              <a:defRPr sz="1800">
+            <a:lvl2pPr marL="342900" indent="0">
+              <a:buNone/>
+              <a:defRPr sz="1350">
                 <a:solidFill>
                   <a:schemeClr val="tx1">
                     <a:tint val="75000"/>
@@ -990,9 +981,9 @@
                 </a:solidFill>
               </a:defRPr>
             </a:lvl2pPr>
-            <a:lvl3pPr marL="914400" indent="0">
-              <a:buNone/>
-              <a:defRPr sz="1600">
+            <a:lvl3pPr marL="685800" indent="0">
+              <a:buNone/>
+              <a:defRPr sz="1200">
                 <a:solidFill>
                   <a:schemeClr val="tx1">
                     <a:tint val="75000"/>
@@ -1000,9 +991,9 @@
                 </a:solidFill>
               </a:defRPr>
             </a:lvl3pPr>
-            <a:lvl4pPr marL="1371600" indent="0">
-              <a:buNone/>
-              <a:defRPr sz="1400">
+            <a:lvl4pPr marL="1028700" indent="0">
+              <a:buNone/>
+              <a:defRPr sz="1050">
                 <a:solidFill>
                   <a:schemeClr val="tx1">
                     <a:tint val="75000"/>
@@ -1010,9 +1001,9 @@
                 </a:solidFill>
               </a:defRPr>
             </a:lvl4pPr>
-            <a:lvl5pPr marL="1828800" indent="0">
-              <a:buNone/>
-              <a:defRPr sz="1400">
+            <a:lvl5pPr marL="1371600" indent="0">
+              <a:buNone/>
+              <a:defRPr sz="1050">
                 <a:solidFill>
                   <a:schemeClr val="tx1">
                     <a:tint val="75000"/>
@@ -1020,9 +1011,9 @@
                 </a:solidFill>
               </a:defRPr>
             </a:lvl5pPr>
-            <a:lvl6pPr marL="2286000" indent="0">
-              <a:buNone/>
-              <a:defRPr sz="1400">
+            <a:lvl6pPr marL="1714500" indent="0">
+              <a:buNone/>
+              <a:defRPr sz="1050">
                 <a:solidFill>
                   <a:schemeClr val="tx1">
                     <a:tint val="75000"/>
@@ -1030,9 +1021,9 @@
                 </a:solidFill>
               </a:defRPr>
             </a:lvl6pPr>
-            <a:lvl7pPr marL="2743200" indent="0">
-              <a:buNone/>
-              <a:defRPr sz="1400">
+            <a:lvl7pPr marL="2057400" indent="0">
+              <a:buNone/>
+              <a:defRPr sz="1050">
                 <a:solidFill>
                   <a:schemeClr val="tx1">
                     <a:tint val="75000"/>
@@ -1040,9 +1031,9 @@
                 </a:solidFill>
               </a:defRPr>
             </a:lvl7pPr>
-            <a:lvl8pPr marL="3200400" indent="0">
-              <a:buNone/>
-              <a:defRPr sz="1400">
+            <a:lvl8pPr marL="2400300" indent="0">
+              <a:buNone/>
+              <a:defRPr sz="1050">
                 <a:solidFill>
                   <a:schemeClr val="tx1">
                     <a:tint val="75000"/>
@@ -1050,9 +1041,9 @@
                 </a:solidFill>
               </a:defRPr>
             </a:lvl8pPr>
-            <a:lvl9pPr marL="3657600" indent="0">
-              <a:buNone/>
-              <a:defRPr sz="1400">
+            <a:lvl9pPr marL="2743200" indent="0">
+              <a:buNone/>
+              <a:defRPr sz="1050">
                 <a:solidFill>
                   <a:schemeClr val="tx1">
                     <a:tint val="75000"/>
@@ -1064,7 +1055,7 @@
           <a:p>
             <a:pPr lvl="0"/>
             <a:r>
-              <a:rPr lang="en-US" smtClean="0"/>
+              <a:rPr lang="en-US"/>
               <a:t>Click to edit Master text styles</a:t>
             </a:r>
           </a:p>
@@ -1087,7 +1078,7 @@
           <a:p>
             <a:fld id="{241EB5C9-1307-BA42-ABA2-0BC069CD8E7F}" type="datetimeFigureOut">
               <a:rPr lang="en-US" smtClean="0"/>
-              <a:t>4/5/2019</a:t>
+              <a:t>1/2/22</a:t>
             </a:fld>
             <a:endParaRPr lang="en-US"/>
           </a:p>
@@ -1181,10 +1172,9 @@
           <a:lstStyle/>
           <a:p>
             <a:r>
-              <a:rPr lang="en-US" smtClean="0"/>
+              <a:rPr lang="en-US"/>
               <a:t>Click to edit Master title style</a:t>
             </a:r>
-            <a:endParaRPr lang="en-US"/>
           </a:p>
         </p:txBody>
       </p:sp>
@@ -1200,76 +1190,75 @@
         </p:nvSpPr>
         <p:spPr>
           <a:xfrm>
-            <a:off x="457200" y="1600200"/>
-            <a:ext cx="4038600" cy="4525963"/>
+            <a:off x="457200" y="1200151"/>
+            <a:ext cx="4038600" cy="3394472"/>
           </a:xfrm>
         </p:spPr>
         <p:txBody>
           <a:bodyPr/>
           <a:lstStyle>
             <a:lvl1pPr>
-              <a:defRPr sz="2800"/>
+              <a:defRPr sz="2100"/>
             </a:lvl1pPr>
             <a:lvl2pPr>
-              <a:defRPr sz="2400"/>
+              <a:defRPr sz="1800"/>
             </a:lvl2pPr>
             <a:lvl3pPr>
-              <a:defRPr sz="2000"/>
+              <a:defRPr sz="1500"/>
             </a:lvl3pPr>
             <a:lvl4pPr>
-              <a:defRPr sz="1800"/>
+              <a:defRPr sz="1350"/>
             </a:lvl4pPr>
             <a:lvl5pPr>
-              <a:defRPr sz="1800"/>
+              <a:defRPr sz="1350"/>
             </a:lvl5pPr>
             <a:lvl6pPr>
-              <a:defRPr sz="1800"/>
+              <a:defRPr sz="1350"/>
             </a:lvl6pPr>
             <a:lvl7pPr>
-              <a:defRPr sz="1800"/>
+              <a:defRPr sz="1350"/>
             </a:lvl7pPr>
             <a:lvl8pPr>
-              <a:defRPr sz="1800"/>
+              <a:defRPr sz="1350"/>
             </a:lvl8pPr>
             <a:lvl9pPr>
-              <a:defRPr sz="1800"/>
+              <a:defRPr sz="1350"/>
             </a:lvl9pPr>
           </a:lstStyle>
           <a:p>
             <a:pPr lvl="0"/>
             <a:r>
-              <a:rPr lang="en-US" smtClean="0"/>
+              <a:rPr lang="en-US"/>
               <a:t>Click to edit Master text styles</a:t>
             </a:r>
           </a:p>
           <a:p>
             <a:pPr lvl="1"/>
             <a:r>
-              <a:rPr lang="en-US" smtClean="0"/>
+              <a:rPr lang="en-US"/>
               <a:t>Second level</a:t>
             </a:r>
           </a:p>
           <a:p>
             <a:pPr lvl="2"/>
             <a:r>
-              <a:rPr lang="en-US" smtClean="0"/>
+              <a:rPr lang="en-US"/>
               <a:t>Third level</a:t>
             </a:r>
           </a:p>
           <a:p>
             <a:pPr lvl="3"/>
             <a:r>
-              <a:rPr lang="en-US" smtClean="0"/>
+              <a:rPr lang="en-US"/>
               <a:t>Fourth level</a:t>
             </a:r>
           </a:p>
           <a:p>
             <a:pPr lvl="4"/>
             <a:r>
-              <a:rPr lang="en-US" smtClean="0"/>
+              <a:rPr lang="en-US"/>
               <a:t>Fifth level</a:t>
             </a:r>
-            <a:endParaRPr lang="en-US"/>
           </a:p>
         </p:txBody>
       </p:sp>
@@ -1285,76 +1274,75 @@
         </p:nvSpPr>
         <p:spPr>
           <a:xfrm>
-            <a:off x="4648200" y="1600200"/>
-            <a:ext cx="4038600" cy="4525963"/>
+            <a:off x="4648200" y="1200151"/>
+            <a:ext cx="4038600" cy="3394472"/>
           </a:xfrm>
         </p:spPr>
         <p:txBody>
           <a:bodyPr/>
           <a:lstStyle>
             <a:lvl1pPr>
-              <a:defRPr sz="2800"/>
+              <a:defRPr sz="2100"/>
             </a:lvl1pPr>
             <a:lvl2pPr>
-              <a:defRPr sz="2400"/>
+              <a:defRPr sz="1800"/>
             </a:lvl2pPr>
             <a:lvl3pPr>
-              <a:defRPr sz="2000"/>
+              <a:defRPr sz="1500"/>
             </a:lvl3pPr>
             <a:lvl4pPr>
-              <a:defRPr sz="1800"/>
+              <a:defRPr sz="1350"/>
             </a:lvl4pPr>
             <a:lvl5pPr>
-              <a:defRPr sz="1800"/>
+              <a:defRPr sz="1350"/>
             </a:lvl5pPr>
             <a:lvl6pPr>
-              <a:defRPr sz="1800"/>
+              <a:defRPr sz="1350"/>
             </a:lvl6pPr>
             <a:lvl7pPr>
-              <a:defRPr sz="1800"/>
+              <a:defRPr sz="1350"/>
             </a:lvl7pPr>
             <a:lvl8pPr>
-              <a:defRPr sz="1800"/>
+              <a:defRPr sz="1350"/>
             </a:lvl8pPr>
             <a:lvl9pPr>
-              <a:defRPr sz="1800"/>
+              <a:defRPr sz="1350"/>
             </a:lvl9pPr>
           </a:lstStyle>
           <a:p>
             <a:pPr lvl="0"/>
             <a:r>
-              <a:rPr lang="en-US" smtClean="0"/>
+              <a:rPr lang="en-US"/>
               <a:t>Click to edit Master text styles</a:t>
             </a:r>
           </a:p>
           <a:p>
             <a:pPr lvl="1"/>
             <a:r>
-              <a:rPr lang="en-US" smtClean="0"/>
+              <a:rPr lang="en-US"/>
               <a:t>Second level</a:t>
             </a:r>
           </a:p>
           <a:p>
             <a:pPr lvl="2"/>
             <a:r>
-              <a:rPr lang="en-US" smtClean="0"/>
+              <a:rPr lang="en-US"/>
               <a:t>Third level</a:t>
             </a:r>
           </a:p>
           <a:p>
             <a:pPr lvl="3"/>
             <a:r>
-              <a:rPr lang="en-US" smtClean="0"/>
+              <a:rPr lang="en-US"/>
               <a:t>Fourth level</a:t>
             </a:r>
           </a:p>
           <a:p>
             <a:pPr lvl="4"/>
             <a:r>
-              <a:rPr lang="en-US" smtClean="0"/>
+              <a:rPr lang="en-US"/>
               <a:t>Fifth level</a:t>
             </a:r>
-            <a:endParaRPr lang="en-US"/>
           </a:p>
         </p:txBody>
       </p:sp>
@@ -1375,7 +1363,7 @@
           <a:p>
             <a:fld id="{241EB5C9-1307-BA42-ABA2-0BC069CD8E7F}" type="datetimeFigureOut">
               <a:rPr lang="en-US" smtClean="0"/>
-              <a:t>4/5/2019</a:t>
+              <a:t>1/2/22</a:t>
             </a:fld>
             <a:endParaRPr lang="en-US"/>
           </a:p>
@@ -1473,10 +1461,9 @@
           </a:lstStyle>
           <a:p>
             <a:r>
-              <a:rPr lang="en-US" smtClean="0"/>
+              <a:rPr lang="en-US"/>
               <a:t>Click to edit Master title style</a:t>
             </a:r>
-            <a:endParaRPr lang="en-US"/>
           </a:p>
         </p:txBody>
       </p:sp>
@@ -1492,8 +1479,8 @@
         </p:nvSpPr>
         <p:spPr>
           <a:xfrm>
-            <a:off x="457200" y="1535113"/>
-            <a:ext cx="4040188" cy="639762"/>
+            <a:off x="457200" y="1151335"/>
+            <a:ext cx="4040188" cy="479822"/>
           </a:xfrm>
         </p:spPr>
         <p:txBody>
@@ -1501,45 +1488,45 @@
           <a:lstStyle>
             <a:lvl1pPr marL="0" indent="0">
               <a:buNone/>
-              <a:defRPr sz="2400" b="1"/>
+              <a:defRPr sz="1800" b="1"/>
             </a:lvl1pPr>
-            <a:lvl2pPr marL="457200" indent="0">
-              <a:buNone/>
-              <a:defRPr sz="2000" b="1"/>
+            <a:lvl2pPr marL="342900" indent="0">
+              <a:buNone/>
+              <a:defRPr sz="1500" b="1"/>
             </a:lvl2pPr>
-            <a:lvl3pPr marL="914400" indent="0">
-              <a:buNone/>
-              <a:defRPr sz="1800" b="1"/>
+            <a:lvl3pPr marL="685800" indent="0">
+              <a:buNone/>
+              <a:defRPr sz="1350" b="1"/>
             </a:lvl3pPr>
-            <a:lvl4pPr marL="1371600" indent="0">
-              <a:buNone/>
-              <a:defRPr sz="1600" b="1"/>
+            <a:lvl4pPr marL="1028700" indent="0">
+              <a:buNone/>
+              <a:defRPr sz="1200" b="1"/>
             </a:lvl4pPr>
-            <a:lvl5pPr marL="1828800" indent="0">
-              <a:buNone/>
-              <a:defRPr sz="1600" b="1"/>
+            <a:lvl5pPr marL="1371600" indent="0">
+              <a:buNone/>
+              <a:defRPr sz="1200" b="1"/>
             </a:lvl5pPr>
-            <a:lvl6pPr marL="2286000" indent="0">
-              <a:buNone/>
-              <a:defRPr sz="1600" b="1"/>
+            <a:lvl6pPr marL="1714500" indent="0">
+              <a:buNone/>
+              <a:defRPr sz="1200" b="1"/>
             </a:lvl6pPr>
-            <a:lvl7pPr marL="2743200" indent="0">
-              <a:buNone/>
-              <a:defRPr sz="1600" b="1"/>
+            <a:lvl7pPr marL="2057400" indent="0">
+              <a:buNone/>
+              <a:defRPr sz="1200" b="1"/>
             </a:lvl7pPr>
-            <a:lvl8pPr marL="3200400" indent="0">
-              <a:buNone/>
-              <a:defRPr sz="1600" b="1"/>
+            <a:lvl8pPr marL="2400300" indent="0">
+              <a:buNone/>
+              <a:defRPr sz="1200" b="1"/>
             </a:lvl8pPr>
-            <a:lvl9pPr marL="3657600" indent="0">
-              <a:buNone/>
-              <a:defRPr sz="1600" b="1"/>
+            <a:lvl9pPr marL="2743200" indent="0">
+              <a:buNone/>
+              <a:defRPr sz="1200" b="1"/>
             </a:lvl9pPr>
           </a:lstStyle>
           <a:p>
             <a:pPr lvl="0"/>
             <a:r>
-              <a:rPr lang="en-US" smtClean="0"/>
+              <a:rPr lang="en-US"/>
               <a:t>Click to edit Master text styles</a:t>
             </a:r>
           </a:p>
@@ -1557,76 +1544,75 @@
         </p:nvSpPr>
         <p:spPr>
           <a:xfrm>
-            <a:off x="457200" y="2174875"/>
-            <a:ext cx="4040188" cy="3951288"/>
+            <a:off x="457200" y="1631156"/>
+            <a:ext cx="4040188" cy="2963466"/>
           </a:xfrm>
         </p:spPr>
         <p:txBody>
           <a:bodyPr/>
           <a:lstStyle>
             <a:lvl1pPr>
-              <a:defRPr sz="2400"/>
+              <a:defRPr sz="1800"/>
             </a:lvl1pPr>
             <a:lvl2pPr>
-              <a:defRPr sz="2000"/>
+              <a:defRPr sz="1500"/>
             </a:lvl2pPr>
             <a:lvl3pPr>
-              <a:defRPr sz="1800"/>
+              <a:defRPr sz="1350"/>
             </a:lvl3pPr>
             <a:lvl4pPr>
-              <a:defRPr sz="1600"/>
+              <a:defRPr sz="1200"/>
             </a:lvl4pPr>
             <a:lvl5pPr>
-              <a:defRPr sz="1600"/>
+              <a:defRPr sz="1200"/>
             </a:lvl5pPr>
             <a:lvl6pPr>
-              <a:defRPr sz="1600"/>
+              <a:defRPr sz="1200"/>
             </a:lvl6pPr>
             <a:lvl7pPr>
-              <a:defRPr sz="1600"/>
+              <a:defRPr sz="1200"/>
             </a:lvl7pPr>
             <a:lvl8pPr>
-              <a:defRPr sz="1600"/>
+              <a:defRPr sz="1200"/>
             </a:lvl8pPr>
             <a:lvl9pPr>
-              <a:defRPr sz="1600"/>
+              <a:defRPr sz="1200"/>
             </a:lvl9pPr>
           </a:lstStyle>
           <a:p>
             <a:pPr lvl="0"/>
             <a:r>
-              <a:rPr lang="en-US" smtClean="0"/>
+              <a:rPr lang="en-US"/>
               <a:t>Click to edit Master text styles</a:t>
             </a:r>
           </a:p>
           <a:p>
             <a:pPr lvl="1"/>
             <a:r>
-              <a:rPr lang="en-US" smtClean="0"/>
+              <a:rPr lang="en-US"/>
               <a:t>Second level</a:t>
             </a:r>
           </a:p>
           <a:p>
             <a:pPr lvl="2"/>
             <a:r>
-              <a:rPr lang="en-US" smtClean="0"/>
+              <a:rPr lang="en-US"/>
               <a:t>Third level</a:t>
             </a:r>
           </a:p>
           <a:p>
             <a:pPr lvl="3"/>
             <a:r>
-              <a:rPr lang="en-US" smtClean="0"/>
+              <a:rPr lang="en-US"/>
               <a:t>Fourth level</a:t>
             </a:r>
           </a:p>
           <a:p>
             <a:pPr lvl="4"/>
             <a:r>
-              <a:rPr lang="en-US" smtClean="0"/>
+              <a:rPr lang="en-US"/>
               <a:t>Fifth level</a:t>
             </a:r>
-            <a:endParaRPr lang="en-US"/>
           </a:p>
         </p:txBody>
       </p:sp>
@@ -1642,8 +1628,8 @@
         </p:nvSpPr>
         <p:spPr>
           <a:xfrm>
-            <a:off x="4645025" y="1535113"/>
-            <a:ext cx="4041775" cy="639762"/>
+            <a:off x="4645026" y="1151335"/>
+            <a:ext cx="4041775" cy="479822"/>
           </a:xfrm>
         </p:spPr>
         <p:txBody>
@@ -1651,45 +1637,45 @@
           <a:lstStyle>
             <a:lvl1pPr marL="0" indent="0">
               <a:buNone/>
-              <a:defRPr sz="2400" b="1"/>
+              <a:defRPr sz="1800" b="1"/>
             </a:lvl1pPr>
-            <a:lvl2pPr marL="457200" indent="0">
-              <a:buNone/>
-              <a:defRPr sz="2000" b="1"/>
+            <a:lvl2pPr marL="342900" indent="0">
+              <a:buNone/>
+              <a:defRPr sz="1500" b="1"/>
             </a:lvl2pPr>
-            <a:lvl3pPr marL="914400" indent="0">
-              <a:buNone/>
-              <a:defRPr sz="1800" b="1"/>
+            <a:lvl3pPr marL="685800" indent="0">
+              <a:buNone/>
+              <a:defRPr sz="1350" b="1"/>
             </a:lvl3pPr>
-            <a:lvl4pPr marL="1371600" indent="0">
-              <a:buNone/>
-              <a:defRPr sz="1600" b="1"/>
+            <a:lvl4pPr marL="1028700" indent="0">
+              <a:buNone/>
+              <a:defRPr sz="1200" b="1"/>
             </a:lvl4pPr>
-            <a:lvl5pPr marL="1828800" indent="0">
-              <a:buNone/>
-              <a:defRPr sz="1600" b="1"/>
+            <a:lvl5pPr marL="1371600" indent="0">
+              <a:buNone/>
+              <a:defRPr sz="1200" b="1"/>
             </a:lvl5pPr>
-            <a:lvl6pPr marL="2286000" indent="0">
-              <a:buNone/>
-              <a:defRPr sz="1600" b="1"/>
+            <a:lvl6pPr marL="1714500" indent="0">
+              <a:buNone/>
+              <a:defRPr sz="1200" b="1"/>
             </a:lvl6pPr>
-            <a:lvl7pPr marL="2743200" indent="0">
-              <a:buNone/>
-              <a:defRPr sz="1600" b="1"/>
+            <a:lvl7pPr marL="2057400" indent="0">
+              <a:buNone/>
+              <a:defRPr sz="1200" b="1"/>
             </a:lvl7pPr>
-            <a:lvl8pPr marL="3200400" indent="0">
-              <a:buNone/>
-              <a:defRPr sz="1600" b="1"/>
+            <a:lvl8pPr marL="2400300" indent="0">
+              <a:buNone/>
+              <a:defRPr sz="1200" b="1"/>
             </a:lvl8pPr>
-            <a:lvl9pPr marL="3657600" indent="0">
-              <a:buNone/>
-              <a:defRPr sz="1600" b="1"/>
+            <a:lvl9pPr marL="2743200" indent="0">
+              <a:buNone/>
+              <a:defRPr sz="1200" b="1"/>
             </a:lvl9pPr>
           </a:lstStyle>
           <a:p>
             <a:pPr lvl="0"/>
             <a:r>
-              <a:rPr lang="en-US" smtClean="0"/>
+              <a:rPr lang="en-US"/>
               <a:t>Click to edit Master text styles</a:t>
             </a:r>
           </a:p>
@@ -1707,76 +1693,75 @@
         </p:nvSpPr>
         <p:spPr>
           <a:xfrm>
-            <a:off x="4645025" y="2174875"/>
-            <a:ext cx="4041775" cy="3951288"/>
+            <a:off x="4645026" y="1631156"/>
+            <a:ext cx="4041775" cy="2963466"/>
           </a:xfrm>
         </p:spPr>
         <p:txBody>
           <a:bodyPr/>
           <a:lstStyle>
             <a:lvl1pPr>
-              <a:defRPr sz="2400"/>
+              <a:defRPr sz="1800"/>
             </a:lvl1pPr>
             <a:lvl2pPr>
-              <a:defRPr sz="2000"/>
+              <a:defRPr sz="1500"/>
             </a:lvl2pPr>
             <a:lvl3pPr>
-              <a:defRPr sz="1800"/>
+              <a:defRPr sz="1350"/>
             </a:lvl3pPr>
             <a:lvl4pPr>
-              <a:defRPr sz="1600"/>
+              <a:defRPr sz="1200"/>
             </a:lvl4pPr>
             <a:lvl5pPr>
-              <a:defRPr sz="1600"/>
+              <a:defRPr sz="1200"/>
             </a:lvl5pPr>
             <a:lvl6pPr>
-              <a:defRPr sz="1600"/>
+              <a:defRPr sz="1200"/>
             </a:lvl6pPr>
             <a:lvl7pPr>
-              <a:defRPr sz="1600"/>
+              <a:defRPr sz="1200"/>
             </a:lvl7pPr>
             <a:lvl8pPr>
-              <a:defRPr sz="1600"/>
+              <a:defRPr sz="1200"/>
             </a:lvl8pPr>
             <a:lvl9pPr>
-              <a:defRPr sz="1600"/>
+              <a:defRPr sz="1200"/>
             </a:lvl9pPr>
           </a:lstStyle>
           <a:p>
             <a:pPr lvl="0"/>
             <a:r>
-              <a:rPr lang="en-US" smtClean="0"/>
+              <a:rPr lang="en-US"/>
               <a:t>Click to edit Master text styles</a:t>
             </a:r>
           </a:p>
           <a:p>
             <a:pPr lvl="1"/>
             <a:r>
-              <a:rPr lang="en-US" smtClean="0"/>
+              <a:rPr lang="en-US"/>
               <a:t>Second level</a:t>
             </a:r>
           </a:p>
           <a:p>
             <a:pPr lvl="2"/>
             <a:r>
-              <a:rPr lang="en-US" smtClean="0"/>
+              <a:rPr lang="en-US"/>
               <a:t>Third level</a:t>
             </a:r>
           </a:p>
           <a:p>
             <a:pPr lvl="3"/>
             <a:r>
-              <a:rPr lang="en-US" smtClean="0"/>
+              <a:rPr lang="en-US"/>
               <a:t>Fourth level</a:t>
             </a:r>
           </a:p>
           <a:p>
             <a:pPr lvl="4"/>
             <a:r>
-              <a:rPr lang="en-US" smtClean="0"/>
+              <a:rPr lang="en-US"/>
               <a:t>Fifth level</a:t>
             </a:r>
-            <a:endParaRPr lang="en-US"/>
           </a:p>
         </p:txBody>
       </p:sp>
@@ -1797,7 +1782,7 @@
           <a:p>
             <a:fld id="{241EB5C9-1307-BA42-ABA2-0BC069CD8E7F}" type="datetimeFigureOut">
               <a:rPr lang="en-US" smtClean="0"/>
-              <a:t>4/5/2019</a:t>
+              <a:t>1/2/22</a:t>
             </a:fld>
             <a:endParaRPr lang="en-US"/>
           </a:p>
@@ -1891,10 +1876,9 @@
           <a:lstStyle/>
           <a:p>
             <a:r>
-              <a:rPr lang="en-US" smtClean="0"/>
+              <a:rPr lang="en-US"/>
               <a:t>Click to edit Master title style</a:t>
             </a:r>
-            <a:endParaRPr lang="en-US"/>
           </a:p>
         </p:txBody>
       </p:sp>
@@ -1915,7 +1899,7 @@
           <a:p>
             <a:fld id="{241EB5C9-1307-BA42-ABA2-0BC069CD8E7F}" type="datetimeFigureOut">
               <a:rPr lang="en-US" smtClean="0"/>
-              <a:t>4/5/2019</a:t>
+              <a:t>1/2/22</a:t>
             </a:fld>
             <a:endParaRPr lang="en-US"/>
           </a:p>
@@ -2010,7 +1994,7 @@
           <a:p>
             <a:fld id="{241EB5C9-1307-BA42-ABA2-0BC069CD8E7F}" type="datetimeFigureOut">
               <a:rPr lang="en-US" smtClean="0"/>
-              <a:t>4/5/2019</a:t>
+              <a:t>1/2/22</a:t>
             </a:fld>
             <a:endParaRPr lang="en-US"/>
           </a:p>
@@ -2100,23 +2084,22 @@
         </p:nvSpPr>
         <p:spPr>
           <a:xfrm>
-            <a:off x="457200" y="273050"/>
-            <a:ext cx="3008313" cy="1162050"/>
+            <a:off x="457201" y="204787"/>
+            <a:ext cx="3008313" cy="871538"/>
           </a:xfrm>
         </p:spPr>
         <p:txBody>
           <a:bodyPr anchor="b"/>
           <a:lstStyle>
             <a:lvl1pPr algn="l">
-              <a:defRPr sz="2000" b="1"/>
+              <a:defRPr sz="1500" b="1"/>
             </a:lvl1pPr>
           </a:lstStyle>
           <a:p>
             <a:r>
-              <a:rPr lang="en-US" smtClean="0"/>
+              <a:rPr lang="en-US"/>
               <a:t>Click to edit Master title style</a:t>
             </a:r>
-            <a:endParaRPr lang="en-US"/>
           </a:p>
         </p:txBody>
       </p:sp>
@@ -2132,76 +2115,75 @@
         </p:nvSpPr>
         <p:spPr>
           <a:xfrm>
-            <a:off x="3575050" y="273050"/>
-            <a:ext cx="5111750" cy="5853113"/>
+            <a:off x="3575050" y="204788"/>
+            <a:ext cx="5111750" cy="4389835"/>
           </a:xfrm>
         </p:spPr>
         <p:txBody>
           <a:bodyPr/>
           <a:lstStyle>
             <a:lvl1pPr>
-              <a:defRPr sz="3200"/>
+              <a:defRPr sz="2400"/>
             </a:lvl1pPr>
             <a:lvl2pPr>
-              <a:defRPr sz="2800"/>
+              <a:defRPr sz="2100"/>
             </a:lvl2pPr>
             <a:lvl3pPr>
-              <a:defRPr sz="2400"/>
+              <a:defRPr sz="1800"/>
             </a:lvl3pPr>
             <a:lvl4pPr>
-              <a:defRPr sz="2000"/>
+              <a:defRPr sz="1500"/>
             </a:lvl4pPr>
             <a:lvl5pPr>
-              <a:defRPr sz="2000"/>
+              <a:defRPr sz="1500"/>
             </a:lvl5pPr>
             <a:lvl6pPr>
-              <a:defRPr sz="2000"/>
+              <a:defRPr sz="1500"/>
             </a:lvl6pPr>
             <a:lvl7pPr>
-              <a:defRPr sz="2000"/>
+              <a:defRPr sz="1500"/>
             </a:lvl7pPr>
             <a:lvl8pPr>
-              <a:defRPr sz="2000"/>
+              <a:defRPr sz="1500"/>
             </a:lvl8pPr>
             <a:lvl9pPr>
-              <a:defRPr sz="2000"/>
+              <a:defRPr sz="1500"/>
             </a:lvl9pPr>
           </a:lstStyle>
           <a:p>
             <a:pPr lvl="0"/>
             <a:r>
-              <a:rPr lang="en-US" smtClean="0"/>
+              <a:rPr lang="en-US"/>
               <a:t>Click to edit Master text styles</a:t>
             </a:r>
           </a:p>
           <a:p>
             <a:pPr lvl="1"/>
             <a:r>
-              <a:rPr lang="en-US" smtClean="0"/>
+              <a:rPr lang="en-US"/>
               <a:t>Second level</a:t>
             </a:r>
           </a:p>
           <a:p>
             <a:pPr lvl="2"/>
             <a:r>
-              <a:rPr lang="en-US" smtClean="0"/>
+              <a:rPr lang="en-US"/>
               <a:t>Third level</a:t>
             </a:r>
           </a:p>
           <a:p>
             <a:pPr lvl="3"/>
             <a:r>
-              <a:rPr lang="en-US" smtClean="0"/>
+              <a:rPr lang="en-US"/>
               <a:t>Fourth level</a:t>
             </a:r>
           </a:p>
           <a:p>
             <a:pPr lvl="4"/>
             <a:r>
-              <a:rPr lang="en-US" smtClean="0"/>
+              <a:rPr lang="en-US"/>
               <a:t>Fifth level</a:t>
             </a:r>
-            <a:endParaRPr lang="en-US"/>
           </a:p>
         </p:txBody>
       </p:sp>
@@ -2217,8 +2199,8 @@
         </p:nvSpPr>
         <p:spPr>
           <a:xfrm>
-            <a:off x="457200" y="1435100"/>
-            <a:ext cx="3008313" cy="4691063"/>
+            <a:off x="457201" y="1076326"/>
+            <a:ext cx="3008313" cy="3518297"/>
           </a:xfrm>
         </p:spPr>
         <p:txBody>
@@ -2226,45 +2208,45 @@
           <a:lstStyle>
             <a:lvl1pPr marL="0" indent="0">
               <a:buNone/>
-              <a:defRPr sz="1400"/>
+              <a:defRPr sz="1050"/>
             </a:lvl1pPr>
-            <a:lvl2pPr marL="457200" indent="0">
-              <a:buNone/>
-              <a:defRPr sz="1200"/>
+            <a:lvl2pPr marL="342900" indent="0">
+              <a:buNone/>
+              <a:defRPr sz="900"/>
             </a:lvl2pPr>
-            <a:lvl3pPr marL="914400" indent="0">
-              <a:buNone/>
-              <a:defRPr sz="1000"/>
+            <a:lvl3pPr marL="685800" indent="0">
+              <a:buNone/>
+              <a:defRPr sz="750"/>
             </a:lvl3pPr>
-            <a:lvl4pPr marL="1371600" indent="0">
-              <a:buNone/>
-              <a:defRPr sz="900"/>
+            <a:lvl4pPr marL="1028700" indent="0">
+              <a:buNone/>
+              <a:defRPr sz="675"/>
             </a:lvl4pPr>
-            <a:lvl5pPr marL="1828800" indent="0">
-              <a:buNone/>
-              <a:defRPr sz="900"/>
+            <a:lvl5pPr marL="1371600" indent="0">
+              <a:buNone/>
+              <a:defRPr sz="675"/>
             </a:lvl5pPr>
-            <a:lvl6pPr marL="2286000" indent="0">
-              <a:buNone/>
-              <a:defRPr sz="900"/>
+            <a:lvl6pPr marL="1714500" indent="0">
+              <a:buNone/>
+              <a:defRPr sz="675"/>
             </a:lvl6pPr>
-            <a:lvl7pPr marL="2743200" indent="0">
-              <a:buNone/>
-              <a:defRPr sz="900"/>
+            <a:lvl7pPr marL="2057400" indent="0">
+              <a:buNone/>
+              <a:defRPr sz="675"/>
             </a:lvl7pPr>
-            <a:lvl8pPr marL="3200400" indent="0">
-              <a:buNone/>
-              <a:defRPr sz="900"/>
+            <a:lvl8pPr marL="2400300" indent="0">
+              <a:buNone/>
+              <a:defRPr sz="675"/>
             </a:lvl8pPr>
-            <a:lvl9pPr marL="3657600" indent="0">
-              <a:buNone/>
-              <a:defRPr sz="900"/>
+            <a:lvl9pPr marL="2743200" indent="0">
+              <a:buNone/>
+              <a:defRPr sz="675"/>
             </a:lvl9pPr>
           </a:lstStyle>
           <a:p>
             <a:pPr lvl="0"/>
             <a:r>
-              <a:rPr lang="en-US" smtClean="0"/>
+              <a:rPr lang="en-US"/>
               <a:t>Click to edit Master text styles</a:t>
             </a:r>
           </a:p>
@@ -2287,7 +2269,7 @@
           <a:p>
             <a:fld id="{241EB5C9-1307-BA42-ABA2-0BC069CD8E7F}" type="datetimeFigureOut">
               <a:rPr lang="en-US" smtClean="0"/>
-              <a:t>4/5/2019</a:t>
+              <a:t>1/2/22</a:t>
             </a:fld>
             <a:endParaRPr lang="en-US"/>
           </a:p>
@@ -2377,23 +2359,22 @@
         </p:nvSpPr>
         <p:spPr>
           <a:xfrm>
-            <a:off x="1792288" y="4800600"/>
-            <a:ext cx="5486400" cy="566738"/>
+            <a:off x="1792288" y="3600450"/>
+            <a:ext cx="5486400" cy="425054"/>
           </a:xfrm>
         </p:spPr>
         <p:txBody>
           <a:bodyPr anchor="b"/>
           <a:lstStyle>
             <a:lvl1pPr algn="l">
-              <a:defRPr sz="2000" b="1"/>
+              <a:defRPr sz="1500" b="1"/>
             </a:lvl1pPr>
           </a:lstStyle>
           <a:p>
             <a:r>
-              <a:rPr lang="en-US" smtClean="0"/>
+              <a:rPr lang="en-US"/>
               <a:t>Click to edit Master title style</a:t>
             </a:r>
-            <a:endParaRPr lang="en-US"/>
           </a:p>
         </p:txBody>
       </p:sp>
@@ -2409,8 +2390,8 @@
         </p:nvSpPr>
         <p:spPr>
           <a:xfrm>
-            <a:off x="1792288" y="612775"/>
-            <a:ext cx="5486400" cy="4114800"/>
+            <a:off x="1792288" y="459581"/>
+            <a:ext cx="5486400" cy="3086100"/>
           </a:xfrm>
         </p:spPr>
         <p:txBody>
@@ -2418,39 +2399,39 @@
           <a:lstStyle>
             <a:lvl1pPr marL="0" indent="0">
               <a:buNone/>
-              <a:defRPr sz="3200"/>
+              <a:defRPr sz="2400"/>
             </a:lvl1pPr>
-            <a:lvl2pPr marL="457200" indent="0">
-              <a:buNone/>
-              <a:defRPr sz="2800"/>
+            <a:lvl2pPr marL="342900" indent="0">
+              <a:buNone/>
+              <a:defRPr sz="2100"/>
             </a:lvl2pPr>
-            <a:lvl3pPr marL="914400" indent="0">
-              <a:buNone/>
-              <a:defRPr sz="2400"/>
+            <a:lvl3pPr marL="685800" indent="0">
+              <a:buNone/>
+              <a:defRPr sz="1800"/>
             </a:lvl3pPr>
-            <a:lvl4pPr marL="1371600" indent="0">
-              <a:buNone/>
-              <a:defRPr sz="2000"/>
+            <a:lvl4pPr marL="1028700" indent="0">
+              <a:buNone/>
+              <a:defRPr sz="1500"/>
             </a:lvl4pPr>
-            <a:lvl5pPr marL="1828800" indent="0">
-              <a:buNone/>
-              <a:defRPr sz="2000"/>
+            <a:lvl5pPr marL="1371600" indent="0">
+              <a:buNone/>
+              <a:defRPr sz="1500"/>
             </a:lvl5pPr>
-            <a:lvl6pPr marL="2286000" indent="0">
-              <a:buNone/>
-              <a:defRPr sz="2000"/>
+            <a:lvl6pPr marL="1714500" indent="0">
+              <a:buNone/>
+              <a:defRPr sz="1500"/>
             </a:lvl6pPr>
-            <a:lvl7pPr marL="2743200" indent="0">
-              <a:buNone/>
-              <a:defRPr sz="2000"/>
+            <a:lvl7pPr marL="2057400" indent="0">
+              <a:buNone/>
+              <a:defRPr sz="1500"/>
             </a:lvl7pPr>
-            <a:lvl8pPr marL="3200400" indent="0">
-              <a:buNone/>
-              <a:defRPr sz="2000"/>
+            <a:lvl8pPr marL="2400300" indent="0">
+              <a:buNone/>
+              <a:defRPr sz="1500"/>
             </a:lvl8pPr>
-            <a:lvl9pPr marL="3657600" indent="0">
-              <a:buNone/>
-              <a:defRPr sz="2000"/>
+            <a:lvl9pPr marL="2743200" indent="0">
+              <a:buNone/>
+              <a:defRPr sz="1500"/>
             </a:lvl9pPr>
           </a:lstStyle>
           <a:p>
@@ -2470,8 +2451,8 @@
         </p:nvSpPr>
         <p:spPr>
           <a:xfrm>
-            <a:off x="1792288" y="5367338"/>
-            <a:ext cx="5486400" cy="804862"/>
+            <a:off x="1792288" y="4025503"/>
+            <a:ext cx="5486400" cy="603647"/>
           </a:xfrm>
         </p:spPr>
         <p:txBody>
@@ -2479,45 +2460,45 @@
           <a:lstStyle>
             <a:lvl1pPr marL="0" indent="0">
               <a:buNone/>
-              <a:defRPr sz="1400"/>
+              <a:defRPr sz="1050"/>
             </a:lvl1pPr>
-            <a:lvl2pPr marL="457200" indent="0">
-              <a:buNone/>
-              <a:defRPr sz="1200"/>
+            <a:lvl2pPr marL="342900" indent="0">
+              <a:buNone/>
+              <a:defRPr sz="900"/>
             </a:lvl2pPr>
-            <a:lvl3pPr marL="914400" indent="0">
-              <a:buNone/>
-              <a:defRPr sz="1000"/>
+            <a:lvl3pPr marL="685800" indent="0">
+              <a:buNone/>
+              <a:defRPr sz="750"/>
             </a:lvl3pPr>
-            <a:lvl4pPr marL="1371600" indent="0">
-              <a:buNone/>
-              <a:defRPr sz="900"/>
+            <a:lvl4pPr marL="1028700" indent="0">
+              <a:buNone/>
+              <a:defRPr sz="675"/>
             </a:lvl4pPr>
-            <a:lvl5pPr marL="1828800" indent="0">
-              <a:buNone/>
-              <a:defRPr sz="900"/>
+            <a:lvl5pPr marL="1371600" indent="0">
+              <a:buNone/>
+              <a:defRPr sz="675"/>
             </a:lvl5pPr>
-            <a:lvl6pPr marL="2286000" indent="0">
-              <a:buNone/>
-              <a:defRPr sz="900"/>
+            <a:lvl6pPr marL="1714500" indent="0">
+              <a:buNone/>
+              <a:defRPr sz="675"/>
             </a:lvl6pPr>
-            <a:lvl7pPr marL="2743200" indent="0">
-              <a:buNone/>
-              <a:defRPr sz="900"/>
+            <a:lvl7pPr marL="2057400" indent="0">
+              <a:buNone/>
+              <a:defRPr sz="675"/>
             </a:lvl7pPr>
-            <a:lvl8pPr marL="3200400" indent="0">
-              <a:buNone/>
-              <a:defRPr sz="900"/>
+            <a:lvl8pPr marL="2400300" indent="0">
+              <a:buNone/>
+              <a:defRPr sz="675"/>
             </a:lvl8pPr>
-            <a:lvl9pPr marL="3657600" indent="0">
-              <a:buNone/>
-              <a:defRPr sz="900"/>
+            <a:lvl9pPr marL="2743200" indent="0">
+              <a:buNone/>
+              <a:defRPr sz="675"/>
             </a:lvl9pPr>
           </a:lstStyle>
           <a:p>
             <a:pPr lvl="0"/>
             <a:r>
-              <a:rPr lang="en-US" smtClean="0"/>
+              <a:rPr lang="en-US"/>
               <a:t>Click to edit Master text styles</a:t>
             </a:r>
           </a:p>
@@ -2540,7 +2521,7 @@
           <a:p>
             <a:fld id="{241EB5C9-1307-BA42-ABA2-0BC069CD8E7F}" type="datetimeFigureOut">
               <a:rPr lang="en-US" smtClean="0"/>
-              <a:t>4/5/2019</a:t>
+              <a:t>1/2/22</a:t>
             </a:fld>
             <a:endParaRPr lang="en-US"/>
           </a:p>
@@ -2635,8 +2616,8 @@
         </p:nvSpPr>
         <p:spPr>
           <a:xfrm>
-            <a:off x="457200" y="274638"/>
-            <a:ext cx="8229600" cy="1143000"/>
+            <a:off x="457200" y="205979"/>
+            <a:ext cx="8229600" cy="857250"/>
           </a:xfrm>
           <a:prstGeom prst="rect">
             <a:avLst/>
@@ -2649,10 +2630,9 @@
           <a:lstStyle/>
           <a:p>
             <a:r>
-              <a:rPr lang="en-US" smtClean="0"/>
+              <a:rPr lang="en-US"/>
               <a:t>Click to edit Master title style</a:t>
             </a:r>
-            <a:endParaRPr lang="en-US"/>
           </a:p>
         </p:txBody>
       </p:sp>
@@ -2668,8 +2648,8 @@
         </p:nvSpPr>
         <p:spPr>
           <a:xfrm>
-            <a:off x="457200" y="1600200"/>
-            <a:ext cx="8229600" cy="4525963"/>
+            <a:off x="457200" y="1200151"/>
+            <a:ext cx="8229600" cy="3394472"/>
           </a:xfrm>
           <a:prstGeom prst="rect">
             <a:avLst/>
@@ -2683,38 +2663,37 @@
           <a:p>
             <a:pPr lvl="0"/>
             <a:r>
-              <a:rPr lang="en-US" smtClean="0"/>
+              <a:rPr lang="en-US"/>
               <a:t>Click to edit Master text styles</a:t>
             </a:r>
           </a:p>
           <a:p>
             <a:pPr lvl="1"/>
             <a:r>
-              <a:rPr lang="en-US" smtClean="0"/>
+              <a:rPr lang="en-US"/>
               <a:t>Second level</a:t>
             </a:r>
           </a:p>
           <a:p>
             <a:pPr lvl="2"/>
             <a:r>
-              <a:rPr lang="en-US" smtClean="0"/>
+              <a:rPr lang="en-US"/>
               <a:t>Third level</a:t>
             </a:r>
           </a:p>
           <a:p>
             <a:pPr lvl="3"/>
             <a:r>
-              <a:rPr lang="en-US" smtClean="0"/>
+              <a:rPr lang="en-US"/>
               <a:t>Fourth level</a:t>
             </a:r>
           </a:p>
           <a:p>
             <a:pPr lvl="4"/>
             <a:r>
-              <a:rPr lang="en-US" smtClean="0"/>
+              <a:rPr lang="en-US"/>
               <a:t>Fifth level</a:t>
             </a:r>
-            <a:endParaRPr lang="en-US"/>
           </a:p>
         </p:txBody>
       </p:sp>
@@ -2730,8 +2709,8 @@
         </p:nvSpPr>
         <p:spPr>
           <a:xfrm>
-            <a:off x="457200" y="6356350"/>
-            <a:ext cx="2133600" cy="365125"/>
+            <a:off x="457200" y="4767263"/>
+            <a:ext cx="2133600" cy="273844"/>
           </a:xfrm>
           <a:prstGeom prst="rect">
             <a:avLst/>
@@ -2741,7 +2720,7 @@
           <a:bodyPr anchor="ctr" bIns="45720" lIns="91440" rIns="91440" rtlCol="0" tIns="45720" vert="horz"/>
           <a:lstStyle>
             <a:lvl1pPr algn="l">
-              <a:defRPr sz="1200">
+              <a:defRPr sz="900">
                 <a:solidFill>
                   <a:schemeClr val="tx1">
                     <a:tint val="75000"/>
@@ -2753,7 +2732,7 @@
           <a:p>
             <a:fld id="{241EB5C9-1307-BA42-ABA2-0BC069CD8E7F}" type="datetimeFigureOut">
               <a:rPr lang="en-US" smtClean="0"/>
-              <a:t>4/5/2019</a:t>
+              <a:t>1/2/22</a:t>
             </a:fld>
             <a:endParaRPr lang="en-US"/>
           </a:p>
@@ -2771,8 +2750,8 @@
         </p:nvSpPr>
         <p:spPr>
           <a:xfrm>
-            <a:off x="3124200" y="6356350"/>
-            <a:ext cx="2895600" cy="365125"/>
+            <a:off x="3124200" y="4767263"/>
+            <a:ext cx="2895600" cy="273844"/>
           </a:xfrm>
           <a:prstGeom prst="rect">
             <a:avLst/>
@@ -2782,7 +2761,7 @@
           <a:bodyPr anchor="ctr" bIns="45720" lIns="91440" rIns="91440" rtlCol="0" tIns="45720" vert="horz"/>
           <a:lstStyle>
             <a:lvl1pPr algn="ctr">
-              <a:defRPr sz="1200">
+              <a:defRPr sz="900">
                 <a:solidFill>
                   <a:schemeClr val="tx1">
                     <a:tint val="75000"/>
@@ -2808,8 +2787,8 @@
         </p:nvSpPr>
         <p:spPr>
           <a:xfrm>
-            <a:off x="6553200" y="6356350"/>
-            <a:ext cx="2133600" cy="365125"/>
+            <a:off x="6553200" y="4767263"/>
+            <a:ext cx="2133600" cy="273844"/>
           </a:xfrm>
           <a:prstGeom prst="rect">
             <a:avLst/>
@@ -2819,7 +2798,7 @@
           <a:bodyPr anchor="ctr" bIns="45720" lIns="91440" rIns="91440" rtlCol="0" tIns="45720" vert="horz"/>
           <a:lstStyle>
             <a:lvl1pPr algn="r">
-              <a:defRPr sz="1200">
+              <a:defRPr sz="900">
                 <a:solidFill>
                   <a:schemeClr val="tx1">
                     <a:tint val="75000"/>
@@ -2860,12 +2839,12 @@
   </p:sldLayoutIdLst>
   <p:txStyles>
     <p:titleStyle>
-      <a:lvl1pPr algn="ctr" defTabSz="457200" eaLnBrk="1" hangingPunct="1" latinLnBrk="0" rtl="0">
+      <a:lvl1pPr algn="ctr" defTabSz="342900" eaLnBrk="1" hangingPunct="1" latinLnBrk="0" rtl="0">
         <a:spcBef>
           <a:spcPct val="0"/>
         </a:spcBef>
         <a:buNone/>
-        <a:defRPr kern="1200" sz="4400">
+        <a:defRPr kern="1200" sz="3300">
           <a:solidFill>
             <a:schemeClr val="tx1"/>
           </a:solidFill>
@@ -2876,37 +2855,7 @@
       </a:lvl1pPr>
     </p:titleStyle>
     <p:bodyStyle>
-      <a:lvl1pPr algn="l" defTabSz="457200" eaLnBrk="1" hangingPunct="1" indent="-457200" latinLnBrk="0" marL="457200" rtl="0">
-        <a:spcBef>
-          <a:spcPct val="20000"/>
-        </a:spcBef>
-        <a:buFont typeface="Arial"/>
-        <a:buChar char="•"/>
-        <a:defRPr kern="1200" sz="3200">
-          <a:solidFill>
-            <a:schemeClr val="tx1"/>
-          </a:solidFill>
-          <a:latin typeface="+mn-lt"/>
-          <a:ea typeface="+mn-ea"/>
-          <a:cs typeface="+mn-cs"/>
-        </a:defRPr>
-      </a:lvl1pPr>
-      <a:lvl2pPr algn="l" defTabSz="457200" eaLnBrk="1" hangingPunct="1" indent="-457200" latinLnBrk="0" marL="914400" rtl="0">
-        <a:spcBef>
-          <a:spcPct val="20000"/>
-        </a:spcBef>
-        <a:buFont typeface="Arial"/>
-        <a:buChar char="–"/>
-        <a:defRPr kern="1200" sz="2800">
-          <a:solidFill>
-            <a:schemeClr val="tx1"/>
-          </a:solidFill>
-          <a:latin typeface="+mn-lt"/>
-          <a:ea typeface="+mn-ea"/>
-          <a:cs typeface="+mn-cs"/>
-        </a:defRPr>
-      </a:lvl2pPr>
-      <a:lvl3pPr algn="l" defTabSz="457200" eaLnBrk="1" hangingPunct="1" indent="-457200" latinLnBrk="0" marL="1371600" rtl="0">
+      <a:lvl1pPr algn="l" defTabSz="342900" eaLnBrk="1" hangingPunct="1" indent="-342900" latinLnBrk="0" marL="342900" rtl="0">
         <a:spcBef>
           <a:spcPct val="20000"/>
         </a:spcBef>
@@ -2920,14 +2869,44 @@
           <a:ea typeface="+mn-ea"/>
           <a:cs typeface="+mn-cs"/>
         </a:defRPr>
-      </a:lvl3pPr>
-      <a:lvl4pPr algn="l" defTabSz="457200" eaLnBrk="1" hangingPunct="1" indent="-457200" latinLnBrk="0" marL="1828800" rtl="0">
+      </a:lvl1pPr>
+      <a:lvl2pPr algn="l" defTabSz="342900" eaLnBrk="1" hangingPunct="1" indent="-342900" latinLnBrk="0" marL="685800" rtl="0">
         <a:spcBef>
           <a:spcPct val="20000"/>
         </a:spcBef>
         <a:buFont typeface="Arial"/>
         <a:buChar char="–"/>
-        <a:defRPr kern="1200" sz="2000">
+        <a:defRPr kern="1200" sz="2100">
+          <a:solidFill>
+            <a:schemeClr val="tx1"/>
+          </a:solidFill>
+          <a:latin typeface="+mn-lt"/>
+          <a:ea typeface="+mn-ea"/>
+          <a:cs typeface="+mn-cs"/>
+        </a:defRPr>
+      </a:lvl2pPr>
+      <a:lvl3pPr algn="l" defTabSz="342900" eaLnBrk="1" hangingPunct="1" indent="-342900" latinLnBrk="0" marL="1028700" rtl="0">
+        <a:spcBef>
+          <a:spcPct val="20000"/>
+        </a:spcBef>
+        <a:buFont typeface="Arial"/>
+        <a:buChar char="•"/>
+        <a:defRPr kern="1200" sz="1800">
+          <a:solidFill>
+            <a:schemeClr val="tx1"/>
+          </a:solidFill>
+          <a:latin typeface="+mn-lt"/>
+          <a:ea typeface="+mn-ea"/>
+          <a:cs typeface="+mn-cs"/>
+        </a:defRPr>
+      </a:lvl3pPr>
+      <a:lvl4pPr algn="l" defTabSz="342900" eaLnBrk="1" hangingPunct="1" indent="-342900" latinLnBrk="0" marL="1371600" rtl="0">
+        <a:spcBef>
+          <a:spcPct val="20000"/>
+        </a:spcBef>
+        <a:buFont typeface="Arial"/>
+        <a:buChar char="–"/>
+        <a:defRPr kern="1200" sz="1500">
           <a:solidFill>
             <a:schemeClr val="tx1"/>
           </a:solidFill>
@@ -2936,13 +2915,13 @@
           <a:cs typeface="+mn-cs"/>
         </a:defRPr>
       </a:lvl4pPr>
-      <a:lvl5pPr algn="l" defTabSz="457200" eaLnBrk="1" hangingPunct="1" indent="-457200" latinLnBrk="0" marL="2286000" rtl="0">
+      <a:lvl5pPr algn="l" defTabSz="342900" eaLnBrk="1" hangingPunct="1" indent="-342900" latinLnBrk="0" marL="1714500" rtl="0">
         <a:spcBef>
           <a:spcPct val="20000"/>
         </a:spcBef>
         <a:buFont typeface="Arial"/>
         <a:buChar char="»"/>
-        <a:defRPr kern="1200" sz="2000">
+        <a:defRPr kern="1200" sz="1500">
           <a:solidFill>
             <a:schemeClr val="tx1"/>
           </a:solidFill>
@@ -2951,13 +2930,13 @@
           <a:cs typeface="+mn-cs"/>
         </a:defRPr>
       </a:lvl5pPr>
-      <a:lvl6pPr algn="l" defTabSz="457200" eaLnBrk="1" hangingPunct="1" indent="-457200" latinLnBrk="0" marL="2743200" rtl="0">
+      <a:lvl6pPr algn="l" defTabSz="342900" eaLnBrk="1" hangingPunct="1" indent="-342900" latinLnBrk="0" marL="2057400" rtl="0">
         <a:spcBef>
           <a:spcPct val="20000"/>
         </a:spcBef>
         <a:buFont typeface="Arial"/>
         <a:buChar char="•"/>
-        <a:defRPr kern="1200" sz="2000">
+        <a:defRPr kern="1200" sz="1500">
           <a:solidFill>
             <a:schemeClr val="tx1"/>
           </a:solidFill>
@@ -2966,13 +2945,13 @@
           <a:cs typeface="+mn-cs"/>
         </a:defRPr>
       </a:lvl6pPr>
-      <a:lvl7pPr algn="l" defTabSz="457200" eaLnBrk="1" hangingPunct="1" indent="-457200" latinLnBrk="0" marL="3200400" rtl="0">
+      <a:lvl7pPr algn="l" defTabSz="342900" eaLnBrk="1" hangingPunct="1" indent="-342900" latinLnBrk="0" marL="2400300" rtl="0">
         <a:spcBef>
           <a:spcPct val="20000"/>
         </a:spcBef>
         <a:buFont typeface="Arial"/>
         <a:buChar char="•"/>
-        <a:defRPr kern="1200" sz="2000">
+        <a:defRPr kern="1200" sz="1500">
           <a:solidFill>
             <a:schemeClr val="tx1"/>
           </a:solidFill>
@@ -2981,13 +2960,13 @@
           <a:cs typeface="+mn-cs"/>
         </a:defRPr>
       </a:lvl7pPr>
-      <a:lvl8pPr algn="l" defTabSz="457200" eaLnBrk="1" hangingPunct="1" indent="-457200" latinLnBrk="0" marL="3657600" rtl="0">
+      <a:lvl8pPr algn="l" defTabSz="342900" eaLnBrk="1" hangingPunct="1" indent="-342900" latinLnBrk="0" marL="2743200" rtl="0">
         <a:spcBef>
           <a:spcPct val="20000"/>
         </a:spcBef>
         <a:buFont typeface="Arial"/>
         <a:buChar char="•"/>
-        <a:defRPr kern="1200" sz="2000">
+        <a:defRPr kern="1200" sz="1500">
           <a:solidFill>
             <a:schemeClr val="tx1"/>
           </a:solidFill>
@@ -2996,13 +2975,13 @@
           <a:cs typeface="+mn-cs"/>
         </a:defRPr>
       </a:lvl8pPr>
-      <a:lvl9pPr algn="l" defTabSz="457200" eaLnBrk="1" hangingPunct="1" indent="-457200" latinLnBrk="0" marL="4114800" rtl="0">
+      <a:lvl9pPr algn="l" defTabSz="342900" eaLnBrk="1" hangingPunct="1" indent="-342900" latinLnBrk="0" marL="3086100" rtl="0">
         <a:spcBef>
           <a:spcPct val="20000"/>
         </a:spcBef>
         <a:buFont typeface="Arial"/>
         <a:buChar char="•"/>
-        <a:defRPr kern="1200" sz="2000">
+        <a:defRPr kern="1200" sz="1500">
           <a:solidFill>
             <a:schemeClr val="tx1"/>
           </a:solidFill>
@@ -3016,8 +2995,8 @@
       <a:defPPr>
         <a:defRPr lang="en-US"/>
       </a:defPPr>
-      <a:lvl1pPr algn="l" defTabSz="457200" eaLnBrk="1" hangingPunct="1" latinLnBrk="0" marL="0" rtl="0">
-        <a:defRPr kern="1200" sz="1800">
+      <a:lvl1pPr algn="l" defTabSz="342900" eaLnBrk="1" hangingPunct="1" latinLnBrk="0" marL="0" rtl="0">
+        <a:defRPr kern="1200" sz="1350">
           <a:solidFill>
             <a:schemeClr val="tx1"/>
           </a:solidFill>
@@ -3026,8 +3005,8 @@
           <a:cs typeface="+mn-cs"/>
         </a:defRPr>
       </a:lvl1pPr>
-      <a:lvl2pPr algn="l" defTabSz="457200" eaLnBrk="1" hangingPunct="1" latinLnBrk="0" marL="457200" rtl="0">
-        <a:defRPr kern="1200" sz="1800">
+      <a:lvl2pPr algn="l" defTabSz="342900" eaLnBrk="1" hangingPunct="1" latinLnBrk="0" marL="342900" rtl="0">
+        <a:defRPr kern="1200" sz="1350">
           <a:solidFill>
             <a:schemeClr val="tx1"/>
           </a:solidFill>
@@ -3036,8 +3015,8 @@
           <a:cs typeface="+mn-cs"/>
         </a:defRPr>
       </a:lvl2pPr>
-      <a:lvl3pPr algn="l" defTabSz="457200" eaLnBrk="1" hangingPunct="1" latinLnBrk="0" marL="914400" rtl="0">
-        <a:defRPr kern="1200" sz="1800">
+      <a:lvl3pPr algn="l" defTabSz="342900" eaLnBrk="1" hangingPunct="1" latinLnBrk="0" marL="685800" rtl="0">
+        <a:defRPr kern="1200" sz="1350">
           <a:solidFill>
             <a:schemeClr val="tx1"/>
           </a:solidFill>
@@ -3046,8 +3025,8 @@
           <a:cs typeface="+mn-cs"/>
         </a:defRPr>
       </a:lvl3pPr>
-      <a:lvl4pPr algn="l" defTabSz="457200" eaLnBrk="1" hangingPunct="1" latinLnBrk="0" marL="1371600" rtl="0">
-        <a:defRPr kern="1200" sz="1800">
+      <a:lvl4pPr algn="l" defTabSz="342900" eaLnBrk="1" hangingPunct="1" latinLnBrk="0" marL="1028700" rtl="0">
+        <a:defRPr kern="1200" sz="1350">
           <a:solidFill>
             <a:schemeClr val="tx1"/>
           </a:solidFill>
@@ -3056,8 +3035,8 @@
           <a:cs typeface="+mn-cs"/>
         </a:defRPr>
       </a:lvl4pPr>
-      <a:lvl5pPr algn="l" defTabSz="457200" eaLnBrk="1" hangingPunct="1" latinLnBrk="0" marL="1828800" rtl="0">
-        <a:defRPr kern="1200" sz="1800">
+      <a:lvl5pPr algn="l" defTabSz="342900" eaLnBrk="1" hangingPunct="1" latinLnBrk="0" marL="1371600" rtl="0">
+        <a:defRPr kern="1200" sz="1350">
           <a:solidFill>
             <a:schemeClr val="tx1"/>
           </a:solidFill>
@@ -3066,8 +3045,8 @@
           <a:cs typeface="+mn-cs"/>
         </a:defRPr>
       </a:lvl5pPr>
-      <a:lvl6pPr algn="l" defTabSz="457200" eaLnBrk="1" hangingPunct="1" latinLnBrk="0" marL="2286000" rtl="0">
-        <a:defRPr kern="1200" sz="1800">
+      <a:lvl6pPr algn="l" defTabSz="342900" eaLnBrk="1" hangingPunct="1" latinLnBrk="0" marL="1714500" rtl="0">
+        <a:defRPr kern="1200" sz="1350">
           <a:solidFill>
             <a:schemeClr val="tx1"/>
           </a:solidFill>
@@ -3076,8 +3055,8 @@
           <a:cs typeface="+mn-cs"/>
         </a:defRPr>
       </a:lvl6pPr>
-      <a:lvl7pPr algn="l" defTabSz="457200" eaLnBrk="1" hangingPunct="1" latinLnBrk="0" marL="2743200" rtl="0">
-        <a:defRPr kern="1200" sz="1800">
+      <a:lvl7pPr algn="l" defTabSz="342900" eaLnBrk="1" hangingPunct="1" latinLnBrk="0" marL="2057400" rtl="0">
+        <a:defRPr kern="1200" sz="1350">
           <a:solidFill>
             <a:schemeClr val="tx1"/>
           </a:solidFill>
@@ -3086,8 +3065,8 @@
           <a:cs typeface="+mn-cs"/>
         </a:defRPr>
       </a:lvl7pPr>
-      <a:lvl8pPr algn="l" defTabSz="457200" eaLnBrk="1" hangingPunct="1" latinLnBrk="0" marL="3200400" rtl="0">
-        <a:defRPr kern="1200" sz="1800">
+      <a:lvl8pPr algn="l" defTabSz="342900" eaLnBrk="1" hangingPunct="1" latinLnBrk="0" marL="2400300" rtl="0">
+        <a:defRPr kern="1200" sz="1350">
           <a:solidFill>
             <a:schemeClr val="tx1"/>
           </a:solidFill>
@@ -3096,8 +3075,8 @@
           <a:cs typeface="+mn-cs"/>
         </a:defRPr>
       </a:lvl8pPr>
-      <a:lvl9pPr algn="l" defTabSz="457200" eaLnBrk="1" hangingPunct="1" latinLnBrk="0" marL="3657600" rtl="0">
-        <a:defRPr kern="1200" sz="1800">
+      <a:lvl9pPr algn="l" defTabSz="342900" eaLnBrk="1" hangingPunct="1" latinLnBrk="0" marL="2743200" rtl="0">
+        <a:defRPr kern="1200" sz="1350">
           <a:solidFill>
             <a:schemeClr val="tx1"/>
           </a:solidFill>
@@ -3140,8 +3119,8 @@
         </p:nvSpPr>
         <p:spPr>
           <a:xfrm>
-            <a:off x="685800" y="2130425"/>
-            <a:ext cx="7772400" cy="1470025"/>
+            <a:off x="685800" y="1597819"/>
+            <a:ext cx="7772400" cy="1102519"/>
           </a:xfrm>
         </p:spPr>
         <p:txBody>
@@ -3170,8 +3149,8 @@
         </p:nvSpPr>
         <p:spPr>
           <a:xfrm>
-            <a:off x="1371600" y="3886200"/>
-            <a:ext cx="6400800" cy="1752600"/>
+            <a:off x="1371600" y="2914650"/>
+            <a:ext cx="6400800" cy="1314450"/>
           </a:xfrm>
         </p:spPr>
         <p:txBody>
@@ -3296,8 +3275,8 @@
         </p:blipFill>
         <p:spPr bwMode="auto">
           <a:xfrm>
-            <a:off x="4749800" y="266700"/>
-            <a:ext cx="2743200" cy="5334000"/>
+            <a:off x="5118100" y="203200"/>
+            <a:ext cx="1993900" cy="3873500"/>
           </a:xfrm>
           <a:prstGeom prst="rect">
             <a:avLst/>
@@ -3318,7 +3297,7 @@
         </p:nvSpPr>
         <p:spPr>
           <a:xfrm>
-            <a:off x="3568700" y="5600700"/>
+            <a:off x="3568700" y="4076700"/>
             <a:ext cx="5105400" cy="508000"/>
           </a:xfrm>
           <a:prstGeom prst="rect">
@@ -3464,8 +3443,8 @@
         </p:blipFill>
         <p:spPr bwMode="auto">
           <a:xfrm>
-            <a:off x="4749800" y="266700"/>
-            <a:ext cx="2743200" cy="5334000"/>
+            <a:off x="5118100" y="203200"/>
+            <a:ext cx="1993900" cy="3873500"/>
           </a:xfrm>
           <a:prstGeom prst="rect">
             <a:avLst/>
@@ -3486,7 +3465,7 @@
         </p:nvSpPr>
         <p:spPr>
           <a:xfrm>
-            <a:off x="3568700" y="5600700"/>
+            <a:off x="3568700" y="4076700"/>
             <a:ext cx="5105400" cy="508000"/>
           </a:xfrm>
           <a:prstGeom prst="rect">
@@ -7045,8 +7024,8 @@
         </p:blipFill>
         <p:spPr bwMode="auto">
           <a:xfrm>
-            <a:off x="4749800" y="266700"/>
-            <a:ext cx="2743200" cy="5334000"/>
+            <a:off x="5118100" y="203200"/>
+            <a:ext cx="1993900" cy="3873500"/>
           </a:xfrm>
           <a:prstGeom prst="rect">
             <a:avLst/>
@@ -7067,7 +7046,7 @@
         </p:nvSpPr>
         <p:spPr>
           <a:xfrm>
-            <a:off x="3568700" y="5600700"/>
+            <a:off x="3568700" y="4076700"/>
             <a:ext cx="5105400" cy="508000"/>
           </a:xfrm>
           <a:prstGeom prst="rect">
@@ -7166,8 +7145,8 @@
         </p:blipFill>
         <p:spPr bwMode="auto">
           <a:xfrm>
-            <a:off x="4749800" y="266700"/>
-            <a:ext cx="2743200" cy="5334000"/>
+            <a:off x="5118100" y="203200"/>
+            <a:ext cx="1993900" cy="3873500"/>
           </a:xfrm>
           <a:prstGeom prst="rect">
             <a:avLst/>
@@ -7188,7 +7167,7 @@
         </p:nvSpPr>
         <p:spPr>
           <a:xfrm>
-            <a:off x="3568700" y="5600700"/>
+            <a:off x="3568700" y="4076700"/>
             <a:ext cx="5105400" cy="508000"/>
           </a:xfrm>
           <a:prstGeom prst="rect">
@@ -7287,8 +7266,8 @@
         </p:blipFill>
         <p:spPr bwMode="auto">
           <a:xfrm>
-            <a:off x="4749800" y="266700"/>
-            <a:ext cx="2743200" cy="5334000"/>
+            <a:off x="5118100" y="203200"/>
+            <a:ext cx="1993900" cy="3873500"/>
           </a:xfrm>
           <a:prstGeom prst="rect">
             <a:avLst/>
@@ -7309,7 +7288,7 @@
         </p:nvSpPr>
         <p:spPr>
           <a:xfrm>
-            <a:off x="3568700" y="5600700"/>
+            <a:off x="3568700" y="4076700"/>
             <a:ext cx="5105400" cy="508000"/>
           </a:xfrm>
           <a:prstGeom prst="rect">
@@ -7408,8 +7387,8 @@
         </p:blipFill>
         <p:spPr bwMode="auto">
           <a:xfrm>
-            <a:off x="4749800" y="266700"/>
-            <a:ext cx="2743200" cy="5334000"/>
+            <a:off x="5118100" y="203200"/>
+            <a:ext cx="1993900" cy="3873500"/>
           </a:xfrm>
           <a:prstGeom prst="rect">
             <a:avLst/>
@@ -7430,7 +7409,7 @@
         </p:nvSpPr>
         <p:spPr>
           <a:xfrm>
-            <a:off x="3568700" y="5600700"/>
+            <a:off x="3568700" y="4076700"/>
             <a:ext cx="5105400" cy="508000"/>
           </a:xfrm>
           <a:prstGeom prst="rect">

</xml_diff>